<commit_message>
Minor fixes to example
Added the images of the to work through
</commit_message>
<xml_diff>
--- a/Example/analysis_presentation.pptx
+++ b/Example/analysis_presentation.pptx
@@ -3126,7 +3126,7 @@
         <p:spPr>
           <a:xfrm>
             <a:off x="0" y="0"/>
-            <a:ext cx="5486400" cy="5220929"/>
+            <a:ext cx="5486400" cy="5400866"/>
           </a:xfrm>
           <a:prstGeom prst="rect">
             <a:avLst/>
@@ -3185,7 +3185,7 @@
         <p:spPr>
           <a:xfrm>
             <a:off x="0" y="0"/>
-            <a:ext cx="5486400" cy="5502536"/>
+            <a:ext cx="5486400" cy="5507261"/>
           </a:xfrm>
           <a:prstGeom prst="rect">
             <a:avLst/>

</xml_diff>